<commit_message>
Update to final presentation
</commit_message>
<xml_diff>
--- a/403 Final presentation.pptx
+++ b/403 Final presentation.pptx
@@ -10,8 +10,8 @@
     <p:sldId id="258" r:id="rId4"/>
     <p:sldId id="259" r:id="rId5"/>
     <p:sldId id="272" r:id="rId6"/>
-    <p:sldId id="273" r:id="rId7"/>
-    <p:sldId id="274" r:id="rId8"/>
+    <p:sldId id="274" r:id="rId7"/>
+    <p:sldId id="273" r:id="rId8"/>
     <p:sldId id="275" r:id="rId9"/>
     <p:sldId id="276" r:id="rId10"/>
     <p:sldId id="277" r:id="rId11"/>
@@ -8208,6 +8208,180 @@
           </a:p>
         </p:txBody>
       </p:sp>
+      <p:sp>
+        <p:nvSpPr>
+          <p:cNvPr id="3" name="Content Placeholder 2"/>
+          <p:cNvSpPr>
+            <a:spLocks noGrp="1"/>
+          </p:cNvSpPr>
+          <p:nvPr>
+            <p:ph idx="1"/>
+          </p:nvPr>
+        </p:nvSpPr>
+        <p:spPr>
+          <a:xfrm>
+            <a:off x="646111" y="1587952"/>
+            <a:ext cx="8946541" cy="4195481"/>
+          </a:xfrm>
+        </p:spPr>
+        <p:txBody>
+          <a:bodyPr>
+            <a:normAutofit lnSpcReduction="10000"/>
+          </a:bodyPr>
+          <a:lstStyle/>
+          <a:p>
+            <a:r>
+              <a:rPr lang="en-US" dirty="0" smtClean="0"/>
+              <a:t>Combined object tracking techniques</a:t>
+            </a:r>
+          </a:p>
+          <a:p>
+            <a:pPr lvl="1"/>
+            <a:r>
+              <a:rPr lang="en-US" dirty="0" smtClean="0"/>
+              <a:t>Blobs</a:t>
+            </a:r>
+          </a:p>
+          <a:p>
+            <a:pPr lvl="2"/>
+            <a:r>
+              <a:rPr lang="en-US" dirty="0" smtClean="0"/>
+              <a:t>The blobs command is a predetermined script that allows for object detection. </a:t>
+            </a:r>
+          </a:p>
+          <a:p>
+            <a:pPr lvl="2"/>
+            <a:r>
+              <a:rPr lang="en-US" dirty="0" smtClean="0"/>
+              <a:t>By implementing this command we do not have to re-invent the wheel.</a:t>
+            </a:r>
+          </a:p>
+          <a:p>
+            <a:pPr lvl="2"/>
+            <a:r>
+              <a:rPr lang="en-US" dirty="0" smtClean="0"/>
+              <a:t>Ability to detect different geometric shapes, color, edges, data each blob contains.</a:t>
+            </a:r>
+          </a:p>
+          <a:p>
+            <a:pPr lvl="1"/>
+            <a:r>
+              <a:rPr lang="en-US" dirty="0" smtClean="0"/>
+              <a:t>Camera/Display</a:t>
+            </a:r>
+          </a:p>
+          <a:p>
+            <a:pPr lvl="2"/>
+            <a:r>
+              <a:rPr lang="en-US" dirty="0" smtClean="0"/>
+              <a:t>Allow the use to open and manipulate video through display</a:t>
+            </a:r>
+          </a:p>
+          <a:p>
+            <a:pPr lvl="1"/>
+            <a:r>
+              <a:rPr lang="en-US" dirty="0" smtClean="0"/>
+              <a:t>Image Processing</a:t>
+            </a:r>
+          </a:p>
+          <a:p>
+            <a:pPr lvl="2"/>
+            <a:r>
+              <a:rPr lang="en-US" dirty="0" smtClean="0"/>
+              <a:t>HSV and RGB color schemes</a:t>
+            </a:r>
+          </a:p>
+          <a:p>
+            <a:pPr lvl="2"/>
+            <a:r>
+              <a:rPr lang="en-US" dirty="0" err="1" smtClean="0"/>
+              <a:t>Historgrams</a:t>
+            </a:r>
+            <a:endParaRPr lang="en-US" dirty="0" smtClean="0"/>
+          </a:p>
+          <a:p>
+            <a:pPr lvl="2"/>
+            <a:r>
+              <a:rPr lang="en-US" dirty="0" smtClean="0"/>
+              <a:t>Image segmentation</a:t>
+            </a:r>
+          </a:p>
+          <a:p>
+            <a:pPr lvl="2"/>
+            <a:endParaRPr lang="en-US" dirty="0" smtClean="0"/>
+          </a:p>
+          <a:p>
+            <a:pPr lvl="2"/>
+            <a:endParaRPr lang="en-US" dirty="0"/>
+          </a:p>
+          <a:p>
+            <a:pPr marL="457200" lvl="1" indent="0">
+              <a:buNone/>
+            </a:pPr>
+            <a:endParaRPr lang="en-US" dirty="0" smtClean="0"/>
+          </a:p>
+        </p:txBody>
+      </p:sp>
+    </p:spTree>
+    <p:extLst>
+      <p:ext uri="{BB962C8B-B14F-4D97-AF65-F5344CB8AC3E}">
+        <p14:creationId xmlns:p14="http://schemas.microsoft.com/office/powerpoint/2010/main" val="713381473"/>
+      </p:ext>
+    </p:extLst>
+  </p:cSld>
+  <p:clrMapOvr>
+    <a:masterClrMapping/>
+  </p:clrMapOvr>
+  <p:timing>
+    <p:tnLst>
+      <p:par>
+        <p:cTn id="1" dur="indefinite" restart="never" nodeType="tmRoot"/>
+      </p:par>
+    </p:tnLst>
+  </p:timing>
+</p:sld>
+</file>
+
+<file path=ppt/slides/slide7.xml><?xml version="1.0" encoding="utf-8"?>
+<p:sld xmlns:a="http://schemas.openxmlformats.org/drawingml/2006/main" xmlns:r="http://schemas.openxmlformats.org/officeDocument/2006/relationships" xmlns:p="http://schemas.openxmlformats.org/presentationml/2006/main">
+  <p:cSld>
+    <p:spTree>
+      <p:nvGrpSpPr>
+        <p:cNvPr id="1" name=""/>
+        <p:cNvGrpSpPr/>
+        <p:nvPr/>
+      </p:nvGrpSpPr>
+      <p:grpSpPr>
+        <a:xfrm>
+          <a:off x="0" y="0"/>
+          <a:ext cx="0" cy="0"/>
+          <a:chOff x="0" y="0"/>
+          <a:chExt cx="0" cy="0"/>
+        </a:xfrm>
+      </p:grpSpPr>
+      <p:sp>
+        <p:nvSpPr>
+          <p:cNvPr id="2" name="Title 1"/>
+          <p:cNvSpPr>
+            <a:spLocks noGrp="1"/>
+          </p:cNvSpPr>
+          <p:nvPr>
+            <p:ph type="title"/>
+          </p:nvPr>
+        </p:nvSpPr>
+        <p:spPr/>
+        <p:txBody>
+          <a:bodyPr/>
+          <a:lstStyle/>
+          <a:p>
+            <a:r>
+              <a:rPr lang="en-US" dirty="0" smtClean="0"/>
+              <a:t>Object Tracking</a:t>
+            </a:r>
+            <a:endParaRPr lang="en-US" dirty="0"/>
+          </a:p>
+        </p:txBody>
+      </p:sp>
       <p:pic>
         <p:nvPicPr>
           <p:cNvPr id="4" name="Content Placeholder 3"/>
@@ -8244,180 +8418,6 @@
   <p:clrMapOvr>
     <a:masterClrMapping/>
   </p:clrMapOvr>
-</p:sld>
-</file>
-
-<file path=ppt/slides/slide7.xml><?xml version="1.0" encoding="utf-8"?>
-<p:sld xmlns:a="http://schemas.openxmlformats.org/drawingml/2006/main" xmlns:r="http://schemas.openxmlformats.org/officeDocument/2006/relationships" xmlns:p="http://schemas.openxmlformats.org/presentationml/2006/main">
-  <p:cSld>
-    <p:spTree>
-      <p:nvGrpSpPr>
-        <p:cNvPr id="1" name=""/>
-        <p:cNvGrpSpPr/>
-        <p:nvPr/>
-      </p:nvGrpSpPr>
-      <p:grpSpPr>
-        <a:xfrm>
-          <a:off x="0" y="0"/>
-          <a:ext cx="0" cy="0"/>
-          <a:chOff x="0" y="0"/>
-          <a:chExt cx="0" cy="0"/>
-        </a:xfrm>
-      </p:grpSpPr>
-      <p:sp>
-        <p:nvSpPr>
-          <p:cNvPr id="2" name="Title 1"/>
-          <p:cNvSpPr>
-            <a:spLocks noGrp="1"/>
-          </p:cNvSpPr>
-          <p:nvPr>
-            <p:ph type="title"/>
-          </p:nvPr>
-        </p:nvSpPr>
-        <p:spPr/>
-        <p:txBody>
-          <a:bodyPr/>
-          <a:lstStyle/>
-          <a:p>
-            <a:r>
-              <a:rPr lang="en-US" dirty="0" smtClean="0"/>
-              <a:t>Object Tracking</a:t>
-            </a:r>
-            <a:endParaRPr lang="en-US" dirty="0"/>
-          </a:p>
-        </p:txBody>
-      </p:sp>
-      <p:sp>
-        <p:nvSpPr>
-          <p:cNvPr id="3" name="Content Placeholder 2"/>
-          <p:cNvSpPr>
-            <a:spLocks noGrp="1"/>
-          </p:cNvSpPr>
-          <p:nvPr>
-            <p:ph idx="1"/>
-          </p:nvPr>
-        </p:nvSpPr>
-        <p:spPr>
-          <a:xfrm>
-            <a:off x="646111" y="1587952"/>
-            <a:ext cx="8946541" cy="4195481"/>
-          </a:xfrm>
-        </p:spPr>
-        <p:txBody>
-          <a:bodyPr>
-            <a:normAutofit lnSpcReduction="10000"/>
-          </a:bodyPr>
-          <a:lstStyle/>
-          <a:p>
-            <a:r>
-              <a:rPr lang="en-US" dirty="0" smtClean="0"/>
-              <a:t>Combined object tracking techniques</a:t>
-            </a:r>
-          </a:p>
-          <a:p>
-            <a:pPr lvl="1"/>
-            <a:r>
-              <a:rPr lang="en-US" dirty="0" smtClean="0"/>
-              <a:t>Blobs</a:t>
-            </a:r>
-          </a:p>
-          <a:p>
-            <a:pPr lvl="2"/>
-            <a:r>
-              <a:rPr lang="en-US" dirty="0" smtClean="0"/>
-              <a:t>The blobs command is a predetermined script that allows for object detection. </a:t>
-            </a:r>
-          </a:p>
-          <a:p>
-            <a:pPr lvl="2"/>
-            <a:r>
-              <a:rPr lang="en-US" dirty="0" smtClean="0"/>
-              <a:t>By implementing this command we do not have to re-invent the wheel.</a:t>
-            </a:r>
-          </a:p>
-          <a:p>
-            <a:pPr lvl="2"/>
-            <a:r>
-              <a:rPr lang="en-US" dirty="0" smtClean="0"/>
-              <a:t>Ability to detect different geometric shapes, color, edges, data each blob contains.</a:t>
-            </a:r>
-          </a:p>
-          <a:p>
-            <a:pPr lvl="1"/>
-            <a:r>
-              <a:rPr lang="en-US" dirty="0" smtClean="0"/>
-              <a:t>Camera/Display</a:t>
-            </a:r>
-          </a:p>
-          <a:p>
-            <a:pPr lvl="2"/>
-            <a:r>
-              <a:rPr lang="en-US" dirty="0" smtClean="0"/>
-              <a:t>Allow the use to open and manipulate video through display</a:t>
-            </a:r>
-          </a:p>
-          <a:p>
-            <a:pPr lvl="1"/>
-            <a:r>
-              <a:rPr lang="en-US" dirty="0" smtClean="0"/>
-              <a:t>Image Processing</a:t>
-            </a:r>
-          </a:p>
-          <a:p>
-            <a:pPr lvl="2"/>
-            <a:r>
-              <a:rPr lang="en-US" dirty="0" smtClean="0"/>
-              <a:t>HSV and RGB color schemes</a:t>
-            </a:r>
-          </a:p>
-          <a:p>
-            <a:pPr lvl="2"/>
-            <a:r>
-              <a:rPr lang="en-US" dirty="0" err="1" smtClean="0"/>
-              <a:t>Historgrams</a:t>
-            </a:r>
-            <a:endParaRPr lang="en-US" dirty="0" smtClean="0"/>
-          </a:p>
-          <a:p>
-            <a:pPr lvl="2"/>
-            <a:r>
-              <a:rPr lang="en-US" dirty="0" smtClean="0"/>
-              <a:t>Image segmentation</a:t>
-            </a:r>
-          </a:p>
-          <a:p>
-            <a:pPr lvl="2"/>
-            <a:endParaRPr lang="en-US" dirty="0" smtClean="0"/>
-          </a:p>
-          <a:p>
-            <a:pPr lvl="2"/>
-            <a:endParaRPr lang="en-US" dirty="0"/>
-          </a:p>
-          <a:p>
-            <a:pPr marL="457200" lvl="1" indent="0">
-              <a:buNone/>
-            </a:pPr>
-            <a:endParaRPr lang="en-US" dirty="0" smtClean="0"/>
-          </a:p>
-        </p:txBody>
-      </p:sp>
-    </p:spTree>
-    <p:extLst>
-      <p:ext uri="{BB962C8B-B14F-4D97-AF65-F5344CB8AC3E}">
-        <p14:creationId xmlns:p14="http://schemas.microsoft.com/office/powerpoint/2010/main" val="713381473"/>
-      </p:ext>
-    </p:extLst>
-  </p:cSld>
-  <p:clrMapOvr>
-    <a:masterClrMapping/>
-  </p:clrMapOvr>
-  <p:timing>
-    <p:tnLst>
-      <p:par>
-        <p:cTn id="1" dur="indefinite" restart="never" nodeType="tmRoot"/>
-      </p:par>
-    </p:tnLst>
-  </p:timing>
 </p:sld>
 </file>
 

</xml_diff>